<commit_message>
GH update Exercise D questions
</commit_message>
<xml_diff>
--- a/GH/Lab3_Diagrams_GH.pptx
+++ b/GH/Lab3_Diagrams_GH.pptx
@@ -131,7 +131,7 @@
 <file path=ppt/revisionInfo.xml><?xml version="1.0" encoding="utf-8"?>
 <p1510:revInfo xmlns:a="http://schemas.openxmlformats.org/drawingml/2006/main" xmlns:r="http://schemas.openxmlformats.org/officeDocument/2006/relationships" xmlns:p1510="http://schemas.microsoft.com/office/powerpoint/2015/10/main">
   <p1510:revLst>
-    <p1510:client id="{743B0715-C183-42DE-B6E5-38E47A36CCC5}" v="95" dt="2021-09-30T16:14:55.265"/>
+    <p1510:client id="{743B0715-C183-42DE-B6E5-38E47A36CCC5}" v="98" dt="2021-09-30T20:01:43.242"/>
   </p1510:revLst>
 </p1510:revInfo>
 </file>
@@ -2053,7 +2053,7 @@
   <pc:docChgLst>
     <pc:chgData name="Graydon Hall" userId="6ad8ef6fe9c5877e" providerId="LiveId" clId="{743B0715-C183-42DE-B6E5-38E47A36CCC5}"/>
     <pc:docChg chg="undo redo custSel addSld modSld sldOrd">
-      <pc:chgData name="Graydon Hall" userId="6ad8ef6fe9c5877e" providerId="LiveId" clId="{743B0715-C183-42DE-B6E5-38E47A36CCC5}" dt="2021-09-30T16:19:51.714" v="3669" actId="207"/>
+      <pc:chgData name="Graydon Hall" userId="6ad8ef6fe9c5877e" providerId="LiveId" clId="{743B0715-C183-42DE-B6E5-38E47A36CCC5}" dt="2021-09-30T20:02:52.623" v="5485" actId="1076"/>
       <pc:docMkLst>
         <pc:docMk/>
       </pc:docMkLst>
@@ -3516,7 +3516,7 @@
         </pc:cxnChg>
       </pc:sldChg>
       <pc:sldChg chg="addSp delSp modSp add mod">
-        <pc:chgData name="Graydon Hall" userId="6ad8ef6fe9c5877e" providerId="LiveId" clId="{743B0715-C183-42DE-B6E5-38E47A36CCC5}" dt="2021-09-30T15:24:08.573" v="1028" actId="20577"/>
+        <pc:chgData name="Graydon Hall" userId="6ad8ef6fe9c5877e" providerId="LiveId" clId="{743B0715-C183-42DE-B6E5-38E47A36CCC5}" dt="2021-09-30T19:01:02.145" v="3791" actId="1076"/>
         <pc:sldMkLst>
           <pc:docMk/>
           <pc:sldMk cId="665027416" sldId="267"/>
@@ -3553,6 +3553,14 @@
             <ac:spMk id="5" creationId="{03DF7978-60AD-4CDE-AE09-356BACC0D746}"/>
           </ac:spMkLst>
         </pc:spChg>
+        <pc:spChg chg="add mod">
+          <ac:chgData name="Graydon Hall" userId="6ad8ef6fe9c5877e" providerId="LiveId" clId="{743B0715-C183-42DE-B6E5-38E47A36CCC5}" dt="2021-09-30T19:00:51.358" v="3788" actId="208"/>
+          <ac:spMkLst>
+            <pc:docMk/>
+            <pc:sldMk cId="665027416" sldId="267"/>
+            <ac:spMk id="10" creationId="{6A13B73C-A4D9-4388-A369-3FD4A51C9DC6}"/>
+          </ac:spMkLst>
+        </pc:spChg>
         <pc:spChg chg="add del mod">
           <ac:chgData name="Graydon Hall" userId="6ad8ef6fe9c5877e" providerId="LiveId" clId="{743B0715-C183-42DE-B6E5-38E47A36CCC5}" dt="2021-09-29T21:11:55.806" v="777" actId="478"/>
           <ac:spMkLst>
@@ -3562,7 +3570,7 @@
           </ac:spMkLst>
         </pc:spChg>
         <pc:spChg chg="mod">
-          <ac:chgData name="Graydon Hall" userId="6ad8ef6fe9c5877e" providerId="LiveId" clId="{743B0715-C183-42DE-B6E5-38E47A36CCC5}" dt="2021-09-29T21:07:26.986" v="763" actId="14100"/>
+          <ac:chgData name="Graydon Hall" userId="6ad8ef6fe9c5877e" providerId="LiveId" clId="{743B0715-C183-42DE-B6E5-38E47A36CCC5}" dt="2021-09-30T18:52:30.362" v="3699" actId="20577"/>
           <ac:spMkLst>
             <pc:docMk/>
             <pc:sldMk cId="665027416" sldId="267"/>
@@ -3823,6 +3831,14 @@
             <pc:docMk/>
             <pc:sldMk cId="665027416" sldId="267"/>
             <ac:spMk id="81" creationId="{E9D4274A-E3E9-4AC0-B99A-4CC0DD026E89}"/>
+          </ac:spMkLst>
+        </pc:spChg>
+        <pc:spChg chg="add mod">
+          <ac:chgData name="Graydon Hall" userId="6ad8ef6fe9c5877e" providerId="LiveId" clId="{743B0715-C183-42DE-B6E5-38E47A36CCC5}" dt="2021-09-30T19:01:02.145" v="3791" actId="1076"/>
+          <ac:spMkLst>
+            <pc:docMk/>
+            <pc:sldMk cId="665027416" sldId="267"/>
+            <ac:spMk id="82" creationId="{3393D78F-D17E-4D5A-87FE-A6C3308EC21C}"/>
           </ac:spMkLst>
         </pc:spChg>
         <pc:grpChg chg="add mod">
@@ -4329,7 +4345,7 @@
         </pc:picChg>
       </pc:sldChg>
       <pc:sldChg chg="addSp delSp modSp new mod addCm">
-        <pc:chgData name="Graydon Hall" userId="6ad8ef6fe9c5877e" providerId="LiveId" clId="{743B0715-C183-42DE-B6E5-38E47A36CCC5}" dt="2021-09-30T16:19:51.714" v="3669" actId="207"/>
+        <pc:chgData name="Graydon Hall" userId="6ad8ef6fe9c5877e" providerId="LiveId" clId="{743B0715-C183-42DE-B6E5-38E47A36CCC5}" dt="2021-09-30T20:02:52.623" v="5485" actId="1076"/>
         <pc:sldMkLst>
           <pc:docMk/>
           <pc:sldMk cId="2983458566" sldId="270"/>
@@ -4343,7 +4359,7 @@
           </ac:spMkLst>
         </pc:spChg>
         <pc:spChg chg="mod">
-          <ac:chgData name="Graydon Hall" userId="6ad8ef6fe9c5877e" providerId="LiveId" clId="{743B0715-C183-42DE-B6E5-38E47A36CCC5}" dt="2021-09-30T16:19:51.714" v="3669" actId="207"/>
+          <ac:chgData name="Graydon Hall" userId="6ad8ef6fe9c5877e" providerId="LiveId" clId="{743B0715-C183-42DE-B6E5-38E47A36CCC5}" dt="2021-09-30T19:50:36.141" v="5379" actId="20577"/>
           <ac:spMkLst>
             <pc:docMk/>
             <pc:sldMk cId="2983458566" sldId="270"/>
@@ -4351,15 +4367,23 @@
           </ac:spMkLst>
         </pc:spChg>
         <pc:spChg chg="add mod">
-          <ac:chgData name="Graydon Hall" userId="6ad8ef6fe9c5877e" providerId="LiveId" clId="{743B0715-C183-42DE-B6E5-38E47A36CCC5}" dt="2021-09-30T15:58:09.215" v="2440" actId="1076"/>
+          <ac:chgData name="Graydon Hall" userId="6ad8ef6fe9c5877e" providerId="LiveId" clId="{743B0715-C183-42DE-B6E5-38E47A36CCC5}" dt="2021-09-30T20:02:43.047" v="5483" actId="1076"/>
           <ac:spMkLst>
             <pc:docMk/>
             <pc:sldMk cId="2983458566" sldId="270"/>
             <ac:spMk id="6" creationId="{CDF078E3-A205-4393-9D38-B21322FF8D87}"/>
           </ac:spMkLst>
         </pc:spChg>
-        <pc:spChg chg="add mod">
-          <ac:chgData name="Graydon Hall" userId="6ad8ef6fe9c5877e" providerId="LiveId" clId="{743B0715-C183-42DE-B6E5-38E47A36CCC5}" dt="2021-09-30T16:03:34.022" v="2820" actId="20577"/>
+        <pc:spChg chg="add del mod">
+          <ac:chgData name="Graydon Hall" userId="6ad8ef6fe9c5877e" providerId="LiveId" clId="{743B0715-C183-42DE-B6E5-38E47A36CCC5}" dt="2021-09-30T20:02:15.644" v="5479" actId="478"/>
+          <ac:spMkLst>
+            <pc:docMk/>
+            <pc:sldMk cId="2983458566" sldId="270"/>
+            <ac:spMk id="7" creationId="{55FB211F-7F24-4091-B517-A46AB3605728}"/>
+          </ac:spMkLst>
+        </pc:spChg>
+        <pc:spChg chg="add del mod">
+          <ac:chgData name="Graydon Hall" userId="6ad8ef6fe9c5877e" providerId="LiveId" clId="{743B0715-C183-42DE-B6E5-38E47A36CCC5}" dt="2021-09-30T20:02:36.522" v="5481" actId="478"/>
           <ac:spMkLst>
             <pc:docMk/>
             <pc:sldMk cId="2983458566" sldId="270"/>
@@ -4367,47 +4391,55 @@
           </ac:spMkLst>
         </pc:spChg>
         <pc:spChg chg="add mod">
-          <ac:chgData name="Graydon Hall" userId="6ad8ef6fe9c5877e" providerId="LiveId" clId="{743B0715-C183-42DE-B6E5-38E47A36CCC5}" dt="2021-09-30T16:13:15.485" v="3200" actId="20577"/>
+          <ac:chgData name="Graydon Hall" userId="6ad8ef6fe9c5877e" providerId="LiveId" clId="{743B0715-C183-42DE-B6E5-38E47A36CCC5}" dt="2021-09-30T20:02:52.623" v="5485" actId="1076"/>
           <ac:spMkLst>
             <pc:docMk/>
             <pc:sldMk cId="2983458566" sldId="270"/>
             <ac:spMk id="18" creationId="{A0EEE247-6E2D-42BB-90AD-C6377E1692D1}"/>
           </ac:spMkLst>
         </pc:spChg>
+        <pc:picChg chg="add del mod">
+          <ac:chgData name="Graydon Hall" userId="6ad8ef6fe9c5877e" providerId="LiveId" clId="{743B0715-C183-42DE-B6E5-38E47A36CCC5}" dt="2021-09-30T20:02:16.981" v="5480" actId="478"/>
+          <ac:picMkLst>
+            <pc:docMk/>
+            <pc:sldMk cId="2983458566" sldId="270"/>
+            <ac:picMk id="4" creationId="{12BCD055-AC38-49C8-9E45-1CA6E0E16B16}"/>
+          </ac:picMkLst>
+        </pc:picChg>
         <pc:picChg chg="add mod">
-          <ac:chgData name="Graydon Hall" userId="6ad8ef6fe9c5877e" providerId="LiveId" clId="{743B0715-C183-42DE-B6E5-38E47A36CCC5}" dt="2021-09-30T15:58:09.215" v="2440" actId="1076"/>
+          <ac:chgData name="Graydon Hall" userId="6ad8ef6fe9c5877e" providerId="LiveId" clId="{743B0715-C183-42DE-B6E5-38E47A36CCC5}" dt="2021-09-30T20:02:43.047" v="5483" actId="1076"/>
           <ac:picMkLst>
             <pc:docMk/>
             <pc:sldMk cId="2983458566" sldId="270"/>
             <ac:picMk id="5" creationId="{91072835-6717-4088-92CE-59186457C105}"/>
           </ac:picMkLst>
         </pc:picChg>
-        <pc:picChg chg="add mod">
-          <ac:chgData name="Graydon Hall" userId="6ad8ef6fe9c5877e" providerId="LiveId" clId="{743B0715-C183-42DE-B6E5-38E47A36CCC5}" dt="2021-09-30T15:58:11.146" v="2441" actId="1076"/>
+        <pc:picChg chg="add del mod">
+          <ac:chgData name="Graydon Hall" userId="6ad8ef6fe9c5877e" providerId="LiveId" clId="{743B0715-C183-42DE-B6E5-38E47A36CCC5}" dt="2021-09-30T20:02:36.522" v="5481" actId="478"/>
           <ac:picMkLst>
             <pc:docMk/>
             <pc:sldMk cId="2983458566" sldId="270"/>
             <ac:picMk id="8" creationId="{AAF35D5C-F7EA-4101-AFB2-58AA3AF80216}"/>
           </ac:picMkLst>
         </pc:picChg>
-        <pc:picChg chg="add mod">
-          <ac:chgData name="Graydon Hall" userId="6ad8ef6fe9c5877e" providerId="LiveId" clId="{743B0715-C183-42DE-B6E5-38E47A36CCC5}" dt="2021-09-30T15:59:18.426" v="2519" actId="14100"/>
+        <pc:picChg chg="add del mod">
+          <ac:chgData name="Graydon Hall" userId="6ad8ef6fe9c5877e" providerId="LiveId" clId="{743B0715-C183-42DE-B6E5-38E47A36CCC5}" dt="2021-09-30T20:02:36.522" v="5481" actId="478"/>
           <ac:picMkLst>
             <pc:docMk/>
             <pc:sldMk cId="2983458566" sldId="270"/>
             <ac:picMk id="11" creationId="{0CBDE164-BC7C-413D-B876-A82081E6216B}"/>
           </ac:picMkLst>
         </pc:picChg>
-        <pc:picChg chg="add mod">
-          <ac:chgData name="Graydon Hall" userId="6ad8ef6fe9c5877e" providerId="LiveId" clId="{743B0715-C183-42DE-B6E5-38E47A36CCC5}" dt="2021-09-30T15:59:58.117" v="2524" actId="1076"/>
+        <pc:picChg chg="add del mod">
+          <ac:chgData name="Graydon Hall" userId="6ad8ef6fe9c5877e" providerId="LiveId" clId="{743B0715-C183-42DE-B6E5-38E47A36CCC5}" dt="2021-09-30T20:02:36.522" v="5481" actId="478"/>
           <ac:picMkLst>
             <pc:docMk/>
             <pc:sldMk cId="2983458566" sldId="270"/>
             <ac:picMk id="13" creationId="{3D224934-5DE7-4AA8-A263-FD343C8EDC8D}"/>
           </ac:picMkLst>
         </pc:picChg>
-        <pc:picChg chg="add mod">
-          <ac:chgData name="Graydon Hall" userId="6ad8ef6fe9c5877e" providerId="LiveId" clId="{743B0715-C183-42DE-B6E5-38E47A36CCC5}" dt="2021-09-30T16:01:19.304" v="2668" actId="14100"/>
+        <pc:picChg chg="add del mod">
+          <ac:chgData name="Graydon Hall" userId="6ad8ef6fe9c5877e" providerId="LiveId" clId="{743B0715-C183-42DE-B6E5-38E47A36CCC5}" dt="2021-09-30T20:02:36.522" v="5481" actId="478"/>
           <ac:picMkLst>
             <pc:docMk/>
             <pc:sldMk cId="2983458566" sldId="270"/>
@@ -4415,7 +4447,7 @@
           </ac:picMkLst>
         </pc:picChg>
         <pc:picChg chg="add mod">
-          <ac:chgData name="Graydon Hall" userId="6ad8ef6fe9c5877e" providerId="LiveId" clId="{743B0715-C183-42DE-B6E5-38E47A36CCC5}" dt="2021-09-30T16:12:34.712" v="3188" actId="1076"/>
+          <ac:chgData name="Graydon Hall" userId="6ad8ef6fe9c5877e" providerId="LiveId" clId="{743B0715-C183-42DE-B6E5-38E47A36CCC5}" dt="2021-09-30T20:02:45.829" v="5484" actId="1076"/>
           <ac:picMkLst>
             <pc:docMk/>
             <pc:sldMk cId="2983458566" sldId="270"/>
@@ -11139,19 +11171,273 @@
             </a:r>
           </a:p>
           <a:p>
+            <a:r>
+              <a:rPr lang="en-CA" sz="900" dirty="0"/>
+              <a:t>In this program, the variable </a:t>
+            </a:r>
+            <a:r>
+              <a:rPr lang="en-CA" sz="900" dirty="0">
+                <a:solidFill>
+                  <a:schemeClr val="tx2"/>
+                </a:solidFill>
+                <a:latin typeface="Consolas" panose="020B0609020204030204" pitchFamily="49" charset="0"/>
+              </a:rPr>
+              <a:t>c</a:t>
+            </a:r>
+            <a:r>
+              <a:rPr lang="en-CA" sz="900" dirty="0"/>
+              <a:t> is set equal to the variable </a:t>
+            </a:r>
+            <a:r>
+              <a:rPr lang="en-CA" sz="900" dirty="0">
+                <a:solidFill>
+                  <a:schemeClr val="tx2"/>
+                </a:solidFill>
+                <a:latin typeface="Consolas" panose="020B0609020204030204" pitchFamily="49" charset="0"/>
+              </a:rPr>
+              <a:t>a</a:t>
+            </a:r>
+            <a:r>
+              <a:rPr lang="en-CA" sz="900" dirty="0"/>
+              <a:t> within an extra pair of curly braces, so the destructor is called for </a:t>
+            </a:r>
+            <a:r>
+              <a:rPr lang="en-CA" sz="900" dirty="0">
+                <a:solidFill>
+                  <a:schemeClr val="tx2"/>
+                </a:solidFill>
+                <a:latin typeface="Consolas" panose="020B0609020204030204" pitchFamily="49" charset="0"/>
+              </a:rPr>
+              <a:t>c</a:t>
+            </a:r>
+            <a:r>
+              <a:rPr lang="en-CA" sz="900" dirty="0">
+                <a:latin typeface="Consolas" panose="020B0609020204030204" pitchFamily="49" charset="0"/>
+              </a:rPr>
+              <a:t> </a:t>
+            </a:r>
+            <a:r>
+              <a:rPr lang="en-CA" sz="900" dirty="0"/>
+              <a:t>after the program exits these extra curly braces (since </a:t>
+            </a:r>
+            <a:r>
+              <a:rPr lang="en-CA" sz="900" dirty="0">
+                <a:solidFill>
+                  <a:schemeClr val="tx2"/>
+                </a:solidFill>
+                <a:latin typeface="Consolas" panose="020B0609020204030204" pitchFamily="49" charset="0"/>
+              </a:rPr>
+              <a:t>c</a:t>
+            </a:r>
+            <a:r>
+              <a:rPr lang="en-CA" sz="900" dirty="0">
+                <a:latin typeface="Consolas" panose="020B0609020204030204" pitchFamily="49" charset="0"/>
+              </a:rPr>
+              <a:t> </a:t>
+            </a:r>
+            <a:r>
+              <a:rPr lang="en-CA" sz="900" dirty="0"/>
+              <a:t>goes out of scope). </a:t>
+            </a:r>
+          </a:p>
+          <a:p>
+            <a:r>
+              <a:rPr lang="en-CA" sz="900" dirty="0"/>
+              <a:t>In the destructor for the </a:t>
+            </a:r>
+            <a:r>
+              <a:rPr lang="en-CA" sz="900" dirty="0" err="1">
+                <a:solidFill>
+                  <a:schemeClr val="tx2"/>
+                </a:solidFill>
+                <a:latin typeface="Consolas" panose="020B0609020204030204" pitchFamily="49" charset="0"/>
+              </a:rPr>
+              <a:t>DynString</a:t>
+            </a:r>
+            <a:r>
+              <a:rPr lang="en-CA" sz="900" dirty="0"/>
+              <a:t> class, the allocated space for </a:t>
+            </a:r>
+            <a:r>
+              <a:rPr lang="en-CA" sz="900" dirty="0" err="1">
+                <a:solidFill>
+                  <a:schemeClr val="tx2"/>
+                </a:solidFill>
+                <a:latin typeface="Consolas" panose="020B0609020204030204" pitchFamily="49" charset="0"/>
+              </a:rPr>
+              <a:t>storageM</a:t>
+            </a:r>
+            <a:r>
+              <a:rPr lang="en-CA" sz="900" dirty="0"/>
+              <a:t> is freed through the line </a:t>
+            </a:r>
+            <a:r>
+              <a:rPr lang="en-CA" sz="900" dirty="0">
+                <a:solidFill>
+                  <a:schemeClr val="tx2"/>
+                </a:solidFill>
+                <a:latin typeface="Consolas" panose="020B0609020204030204" pitchFamily="49" charset="0"/>
+              </a:rPr>
+              <a:t>delete [] </a:t>
+            </a:r>
+            <a:r>
+              <a:rPr lang="en-CA" sz="900" dirty="0" err="1">
+                <a:solidFill>
+                  <a:schemeClr val="tx2"/>
+                </a:solidFill>
+                <a:latin typeface="Consolas" panose="020B0609020204030204" pitchFamily="49" charset="0"/>
+              </a:rPr>
+              <a:t>storageM</a:t>
+            </a:r>
+            <a:r>
+              <a:rPr lang="en-CA" sz="900" dirty="0">
+                <a:solidFill>
+                  <a:schemeClr val="tx2"/>
+                </a:solidFill>
+                <a:latin typeface="Consolas" panose="020B0609020204030204" pitchFamily="49" charset="0"/>
+              </a:rPr>
+              <a:t>;</a:t>
+            </a:r>
+            <a:r>
+              <a:rPr lang="en-CA" sz="900" dirty="0"/>
+              <a:t> but the pointer pointing to that spot is still pointing there. </a:t>
+            </a:r>
+          </a:p>
+          <a:p>
+            <a:r>
+              <a:rPr lang="en-CA" sz="900" dirty="0"/>
+              <a:t>Since </a:t>
+            </a:r>
+            <a:r>
+              <a:rPr lang="en-CA" sz="900" dirty="0">
+                <a:solidFill>
+                  <a:schemeClr val="tx2"/>
+                </a:solidFill>
+                <a:latin typeface="Consolas" panose="020B0609020204030204" pitchFamily="49" charset="0"/>
+              </a:rPr>
+              <a:t>c</a:t>
+            </a:r>
+            <a:r>
+              <a:rPr lang="en-CA" sz="900" dirty="0"/>
+              <a:t> was set equal to </a:t>
+            </a:r>
+            <a:r>
+              <a:rPr lang="en-CA" sz="900" dirty="0">
+                <a:solidFill>
+                  <a:schemeClr val="tx2"/>
+                </a:solidFill>
+                <a:latin typeface="Consolas" panose="020B0609020204030204" pitchFamily="49" charset="0"/>
+              </a:rPr>
+              <a:t>a</a:t>
+            </a:r>
+            <a:r>
+              <a:rPr lang="en-CA" sz="900" dirty="0"/>
+              <a:t>, their </a:t>
+            </a:r>
+            <a:r>
+              <a:rPr lang="en-CA" sz="900" dirty="0" err="1">
+                <a:solidFill>
+                  <a:schemeClr val="tx2"/>
+                </a:solidFill>
+                <a:latin typeface="Consolas" panose="020B0609020204030204" pitchFamily="49" charset="0"/>
+              </a:rPr>
+              <a:t>storageM</a:t>
+            </a:r>
+            <a:r>
+              <a:rPr lang="en-CA" sz="900" dirty="0"/>
+              <a:t> pointer pointed to the same location in heap memory. </a:t>
+            </a:r>
+          </a:p>
+          <a:p>
+            <a:r>
+              <a:rPr lang="en-CA" sz="900" dirty="0"/>
+              <a:t>Therefore, when the destructor for </a:t>
+            </a:r>
+            <a:r>
+              <a:rPr lang="en-CA" sz="900" dirty="0">
+                <a:solidFill>
+                  <a:schemeClr val="tx2"/>
+                </a:solidFill>
+                <a:latin typeface="Consolas" panose="020B0609020204030204" pitchFamily="49" charset="0"/>
+              </a:rPr>
+              <a:t>a</a:t>
+            </a:r>
+            <a:r>
+              <a:rPr lang="en-CA" sz="900" dirty="0"/>
+              <a:t> is called again at the end of the main function, and we try to de-allocate the memory for </a:t>
+            </a:r>
+            <a:r>
+              <a:rPr lang="en-CA" sz="900" dirty="0" err="1">
+                <a:solidFill>
+                  <a:schemeClr val="tx2"/>
+                </a:solidFill>
+                <a:latin typeface="Consolas" panose="020B0609020204030204" pitchFamily="49" charset="0"/>
+              </a:rPr>
+              <a:t>storageM</a:t>
+            </a:r>
+            <a:r>
+              <a:rPr lang="en-CA" sz="900" dirty="0"/>
+              <a:t> that was already de-allocated, we get an error. </a:t>
+            </a:r>
+          </a:p>
+          <a:p>
+            <a:r>
+              <a:rPr lang="en-CA" sz="900" dirty="0"/>
+              <a:t>A way to solve this would be adding </a:t>
+            </a:r>
+            <a:r>
+              <a:rPr lang="en-CA" sz="900" dirty="0" err="1">
+                <a:solidFill>
+                  <a:schemeClr val="tx2"/>
+                </a:solidFill>
+                <a:latin typeface="Consolas" panose="020B0609020204030204" pitchFamily="49" charset="0"/>
+              </a:rPr>
+              <a:t>storageM</a:t>
+            </a:r>
+            <a:r>
+              <a:rPr lang="en-CA" sz="900" dirty="0">
+                <a:solidFill>
+                  <a:schemeClr val="tx2"/>
+                </a:solidFill>
+                <a:latin typeface="Consolas" panose="020B0609020204030204" pitchFamily="49" charset="0"/>
+              </a:rPr>
+              <a:t> = </a:t>
+            </a:r>
+            <a:r>
+              <a:rPr lang="en-CA" sz="900" dirty="0" err="1">
+                <a:solidFill>
+                  <a:schemeClr val="tx2"/>
+                </a:solidFill>
+                <a:latin typeface="Consolas" panose="020B0609020204030204" pitchFamily="49" charset="0"/>
+              </a:rPr>
+              <a:t>nullptr</a:t>
+            </a:r>
+            <a:r>
+              <a:rPr lang="en-CA" sz="900" dirty="0"/>
+              <a:t> within the destructor for the </a:t>
+            </a:r>
+            <a:r>
+              <a:rPr lang="en-CA" sz="900" dirty="0" err="1">
+                <a:solidFill>
+                  <a:schemeClr val="tx2"/>
+                </a:solidFill>
+                <a:latin typeface="Consolas" panose="020B0609020204030204" pitchFamily="49" charset="0"/>
+              </a:rPr>
+              <a:t>DynString</a:t>
+            </a:r>
+            <a:r>
+              <a:rPr lang="en-CA" sz="900" dirty="0"/>
+              <a:t> class.  </a:t>
+            </a:r>
+          </a:p>
+          <a:p>
             <a:pPr marL="0" indent="0">
               <a:buNone/>
             </a:pPr>
             <a:r>
-              <a:rPr lang="en-US" sz="900" dirty="0"/>
-              <a:t>I believe the issue that arises is a result of using the delete statement on b, when b is a pointer. In the class notes, it is stated that you should “not use delete for variables that their space is not allocated by new.”</a:t>
-            </a:r>
-          </a:p>
-          <a:p>
-            <a:pPr marL="0" indent="0">
-              <a:buNone/>
-            </a:pPr>
-            <a:endParaRPr lang="en-CA" sz="900" dirty="0"/>
+              <a:rPr lang="en-CA" sz="900" dirty="0"/>
+              <a:t> </a:t>
+            </a:r>
           </a:p>
         </p:txBody>
       </p:sp>
@@ -11177,7 +11463,7 @@
         </p:blipFill>
         <p:spPr>
           <a:xfrm>
-            <a:off x="7053262" y="9493339"/>
+            <a:off x="7337054" y="6096000"/>
             <a:ext cx="4457894" cy="1733296"/>
           </a:xfrm>
           <a:prstGeom prst="rect">
@@ -11199,7 +11485,7 @@
         </p:nvSpPr>
         <p:spPr>
           <a:xfrm>
-            <a:off x="7053262" y="11220539"/>
+            <a:off x="7337054" y="7823200"/>
             <a:ext cx="4449763" cy="600164"/>
           </a:xfrm>
           <a:prstGeom prst="rect">
@@ -11225,10 +11511,10 @@
       </p:sp>
       <p:pic>
         <p:nvPicPr>
-          <p:cNvPr id="8" name="Picture 7">
-            <a:extLst>
-              <a:ext uri="{FF2B5EF4-FFF2-40B4-BE49-F238E27FC236}">
-                <a16:creationId xmlns:a16="http://schemas.microsoft.com/office/drawing/2014/main" id="{AAF35D5C-F7EA-4101-AFB2-58AA3AF80216}"/>
+          <p:cNvPr id="17" name="Picture 16">
+            <a:extLst>
+              <a:ext uri="{FF2B5EF4-FFF2-40B4-BE49-F238E27FC236}">
+                <a16:creationId xmlns:a16="http://schemas.microsoft.com/office/drawing/2014/main" id="{D6C88F5A-F3A4-4CD9-83B5-3EDE747F749D}"/>
               </a:ext>
             </a:extLst>
           </p:cNvPr>
@@ -11245,8 +11531,8 @@
         </p:blipFill>
         <p:spPr>
           <a:xfrm>
-            <a:off x="7053262" y="7113412"/>
-            <a:ext cx="3291215" cy="914597"/>
+            <a:off x="7720012" y="1477977"/>
+            <a:ext cx="6858000" cy="3754423"/>
           </a:xfrm>
           <a:prstGeom prst="rect">
             <a:avLst/>
@@ -11255,10 +11541,10 @@
       </p:pic>
       <p:sp>
         <p:nvSpPr>
-          <p:cNvPr id="9" name="TextBox 8">
-            <a:extLst>
-              <a:ext uri="{FF2B5EF4-FFF2-40B4-BE49-F238E27FC236}">
-                <a16:creationId xmlns:a16="http://schemas.microsoft.com/office/drawing/2014/main" id="{01F79AFD-649A-4CD1-9506-3F8F8DDAA862}"/>
+          <p:cNvPr id="18" name="TextBox 17">
+            <a:extLst>
+              <a:ext uri="{FF2B5EF4-FFF2-40B4-BE49-F238E27FC236}">
+                <a16:creationId xmlns:a16="http://schemas.microsoft.com/office/drawing/2014/main" id="{A0EEE247-6E2D-42BB-90AD-C6377E1692D1}"/>
               </a:ext>
             </a:extLst>
           </p:cNvPr>
@@ -11267,208 +11553,7 @@
         </p:nvSpPr>
         <p:spPr>
           <a:xfrm>
-            <a:off x="7053262" y="8020050"/>
-            <a:ext cx="3262313" cy="923330"/>
-          </a:xfrm>
-          <a:prstGeom prst="rect">
-            <a:avLst/>
-          </a:prstGeom>
-          <a:noFill/>
-        </p:spPr>
-        <p:txBody>
-          <a:bodyPr wrap="square" rtlCol="0">
-            <a:spAutoFit/>
-          </a:bodyPr>
-          <a:lstStyle/>
-          <a:p>
-            <a:r>
-              <a:rPr lang="en-US" sz="900" dirty="0"/>
-              <a:t>Is the error something to do with not setting </a:t>
-            </a:r>
-            <a:r>
-              <a:rPr lang="en-US" sz="900" dirty="0" err="1"/>
-              <a:t>strageM</a:t>
-            </a:r>
-            <a:r>
-              <a:rPr lang="en-US" sz="900" dirty="0"/>
-              <a:t> = </a:t>
-            </a:r>
-            <a:r>
-              <a:rPr lang="en-US" sz="900" dirty="0" err="1"/>
-              <a:t>nullptr</a:t>
-            </a:r>
-            <a:r>
-              <a:rPr lang="en-US" sz="900" dirty="0"/>
-              <a:t>? Or is it that we use delete on b and b is a pointer? The thing is I don’t actually get an error on my computer</a:t>
-            </a:r>
-          </a:p>
-          <a:p>
-            <a:endParaRPr lang="en-US" sz="900" dirty="0"/>
-          </a:p>
-          <a:p>
-            <a:r>
-              <a:rPr lang="en-US" sz="900" dirty="0"/>
-              <a:t>Honestly </a:t>
-            </a:r>
-            <a:r>
-              <a:rPr lang="en-US" sz="900" dirty="0" err="1"/>
-              <a:t>ya</a:t>
-            </a:r>
-            <a:r>
-              <a:rPr lang="en-US" sz="900" dirty="0"/>
-              <a:t> it seems like 2 issues… shouldn’t use delete on b and should maybe have wrote </a:t>
-            </a:r>
-            <a:r>
-              <a:rPr lang="en-US" sz="900" dirty="0" err="1"/>
-              <a:t>storageM</a:t>
-            </a:r>
-            <a:r>
-              <a:rPr lang="en-US" sz="900" dirty="0"/>
-              <a:t> = </a:t>
-            </a:r>
-            <a:r>
-              <a:rPr lang="en-US" sz="900" dirty="0" err="1"/>
-              <a:t>nullptr</a:t>
-            </a:r>
-            <a:endParaRPr lang="en-CA" sz="900" dirty="0"/>
-          </a:p>
-        </p:txBody>
-      </p:sp>
-      <p:pic>
-        <p:nvPicPr>
-          <p:cNvPr id="11" name="Picture 10">
-            <a:extLst>
-              <a:ext uri="{FF2B5EF4-FFF2-40B4-BE49-F238E27FC236}">
-                <a16:creationId xmlns:a16="http://schemas.microsoft.com/office/drawing/2014/main" id="{0CBDE164-BC7C-413D-B876-A82081E6216B}"/>
-              </a:ext>
-            </a:extLst>
-          </p:cNvPr>
-          <p:cNvPicPr>
-            <a:picLocks noChangeAspect="1"/>
-          </p:cNvPicPr>
-          <p:nvPr/>
-        </p:nvPicPr>
-        <p:blipFill>
-          <a:blip r:embed="rId6"/>
-          <a:stretch>
-            <a:fillRect/>
-          </a:stretch>
-        </p:blipFill>
-        <p:spPr>
-          <a:xfrm>
-            <a:off x="7110739" y="5276850"/>
-            <a:ext cx="4960434" cy="1836562"/>
-          </a:xfrm>
-          <a:prstGeom prst="rect">
-            <a:avLst/>
-          </a:prstGeom>
-        </p:spPr>
-      </p:pic>
-      <p:pic>
-        <p:nvPicPr>
-          <p:cNvPr id="13" name="Picture 12">
-            <a:extLst>
-              <a:ext uri="{FF2B5EF4-FFF2-40B4-BE49-F238E27FC236}">
-                <a16:creationId xmlns:a16="http://schemas.microsoft.com/office/drawing/2014/main" id="{3D224934-5DE7-4AA8-A263-FD343C8EDC8D}"/>
-              </a:ext>
-            </a:extLst>
-          </p:cNvPr>
-          <p:cNvPicPr>
-            <a:picLocks noChangeAspect="1"/>
-          </p:cNvPicPr>
-          <p:nvPr/>
-        </p:nvPicPr>
-        <p:blipFill>
-          <a:blip r:embed="rId7"/>
-          <a:stretch>
-            <a:fillRect/>
-          </a:stretch>
-        </p:blipFill>
-        <p:spPr>
-          <a:xfrm>
-            <a:off x="10373052" y="7080250"/>
-            <a:ext cx="2619482" cy="1879600"/>
-          </a:xfrm>
-          <a:prstGeom prst="rect">
-            <a:avLst/>
-          </a:prstGeom>
-        </p:spPr>
-      </p:pic>
-      <p:pic>
-        <p:nvPicPr>
-          <p:cNvPr id="15" name="Picture 14">
-            <a:extLst>
-              <a:ext uri="{FF2B5EF4-FFF2-40B4-BE49-F238E27FC236}">
-                <a16:creationId xmlns:a16="http://schemas.microsoft.com/office/drawing/2014/main" id="{47B13868-DA25-4272-85A0-CA7C3837098D}"/>
-              </a:ext>
-            </a:extLst>
-          </p:cNvPr>
-          <p:cNvPicPr>
-            <a:picLocks noChangeAspect="1"/>
-          </p:cNvPicPr>
-          <p:nvPr/>
-        </p:nvPicPr>
-        <p:blipFill>
-          <a:blip r:embed="rId8"/>
-          <a:stretch>
-            <a:fillRect/>
-          </a:stretch>
-        </p:blipFill>
-        <p:spPr>
-          <a:xfrm>
-            <a:off x="7121939" y="4502150"/>
-            <a:ext cx="2529276" cy="775428"/>
-          </a:xfrm>
-          <a:prstGeom prst="rect">
-            <a:avLst/>
-          </a:prstGeom>
-        </p:spPr>
-      </p:pic>
-      <p:pic>
-        <p:nvPicPr>
-          <p:cNvPr id="17" name="Picture 16">
-            <a:extLst>
-              <a:ext uri="{FF2B5EF4-FFF2-40B4-BE49-F238E27FC236}">
-                <a16:creationId xmlns:a16="http://schemas.microsoft.com/office/drawing/2014/main" id="{D6C88F5A-F3A4-4CD9-83B5-3EDE747F749D}"/>
-              </a:ext>
-            </a:extLst>
-          </p:cNvPr>
-          <p:cNvPicPr>
-            <a:picLocks noChangeAspect="1"/>
-          </p:cNvPicPr>
-          <p:nvPr/>
-        </p:nvPicPr>
-        <p:blipFill>
-          <a:blip r:embed="rId9"/>
-          <a:stretch>
-            <a:fillRect/>
-          </a:stretch>
-        </p:blipFill>
-        <p:spPr>
-          <a:xfrm>
-            <a:off x="7053262" y="371297"/>
-            <a:ext cx="6858000" cy="3754423"/>
-          </a:xfrm>
-          <a:prstGeom prst="rect">
-            <a:avLst/>
-          </a:prstGeom>
-        </p:spPr>
-      </p:pic>
-      <p:sp>
-        <p:nvSpPr>
-          <p:cNvPr id="18" name="TextBox 17">
-            <a:extLst>
-              <a:ext uri="{FF2B5EF4-FFF2-40B4-BE49-F238E27FC236}">
-                <a16:creationId xmlns:a16="http://schemas.microsoft.com/office/drawing/2014/main" id="{A0EEE247-6E2D-42BB-90AD-C6377E1692D1}"/>
-              </a:ext>
-            </a:extLst>
-          </p:cNvPr>
-          <p:cNvSpPr txBox="1"/>
-          <p:nvPr/>
-        </p:nvSpPr>
-        <p:spPr>
-          <a:xfrm>
-            <a:off x="7053262" y="133350"/>
+            <a:off x="7720012" y="1139423"/>
             <a:ext cx="5939272" cy="338554"/>
           </a:xfrm>
           <a:prstGeom prst="rect">
@@ -21240,7 +21325,7 @@
             <a:pPr algn="ctr"/>
             <a:r>
               <a:rPr lang="en-US" sz="1200" dirty="0"/>
-              <a:t>Exercise D Point 2</a:t>
+              <a:t>Exercise D Point 1 Second Time</a:t>
             </a:r>
           </a:p>
         </p:txBody>
@@ -23997,6 +24082,147 @@
                 <a:srgbClr val="00B050"/>
               </a:solidFill>
             </a:endParaRPr>
+          </a:p>
+        </p:txBody>
+      </p:sp>
+      <p:sp>
+        <p:nvSpPr>
+          <p:cNvPr id="82" name="TextBox 81">
+            <a:extLst>
+              <a:ext uri="{FF2B5EF4-FFF2-40B4-BE49-F238E27FC236}">
+                <a16:creationId xmlns:a16="http://schemas.microsoft.com/office/drawing/2014/main" id="{3393D78F-D17E-4D5A-87FE-A6C3308EC21C}"/>
+              </a:ext>
+            </a:extLst>
+          </p:cNvPr>
+          <p:cNvSpPr txBox="1"/>
+          <p:nvPr/>
+        </p:nvSpPr>
+        <p:spPr>
+          <a:xfrm>
+            <a:off x="7025640" y="5283957"/>
+            <a:ext cx="1178099" cy="900246"/>
+          </a:xfrm>
+          <a:prstGeom prst="rect">
+            <a:avLst/>
+          </a:prstGeom>
+          <a:noFill/>
+          <a:ln>
+            <a:solidFill>
+              <a:srgbClr val="FF0000"/>
+            </a:solidFill>
+          </a:ln>
+        </p:spPr>
+        <p:txBody>
+          <a:bodyPr wrap="square" rtlCol="0">
+            <a:spAutoFit/>
+          </a:bodyPr>
+          <a:lstStyle/>
+          <a:p>
+            <a:r>
+              <a:rPr lang="en-US" sz="1050" dirty="0">
+                <a:solidFill>
+                  <a:srgbClr val="00B050"/>
+                </a:solidFill>
+              </a:rPr>
+              <a:t>Q: Do we omit this arrow since return statement not reached yet in constructor?</a:t>
+            </a:r>
+            <a:endParaRPr lang="en-CA" sz="1050" dirty="0">
+              <a:solidFill>
+                <a:srgbClr val="00B050"/>
+              </a:solidFill>
+            </a:endParaRPr>
+          </a:p>
+        </p:txBody>
+      </p:sp>
+      <p:sp>
+        <p:nvSpPr>
+          <p:cNvPr id="10" name="Freeform: Shape 9">
+            <a:extLst>
+              <a:ext uri="{FF2B5EF4-FFF2-40B4-BE49-F238E27FC236}">
+                <a16:creationId xmlns:a16="http://schemas.microsoft.com/office/drawing/2014/main" id="{6A13B73C-A4D9-4388-A369-3FD4A51C9DC6}"/>
+              </a:ext>
+            </a:extLst>
+          </p:cNvPr>
+          <p:cNvSpPr/>
+          <p:nvPr/>
+        </p:nvSpPr>
+        <p:spPr>
+          <a:xfrm>
+            <a:off x="4505331" y="5715000"/>
+            <a:ext cx="2520309" cy="1196340"/>
+          </a:xfrm>
+          <a:custGeom>
+            <a:avLst/>
+            <a:gdLst>
+              <a:gd name="connsiteX0" fmla="*/ 2520309 w 2520309"/>
+              <a:gd name="connsiteY0" fmla="*/ 0 h 1196340"/>
+              <a:gd name="connsiteX1" fmla="*/ 394329 w 2520309"/>
+              <a:gd name="connsiteY1" fmla="*/ 480060 h 1196340"/>
+              <a:gd name="connsiteX2" fmla="*/ 5709 w 2520309"/>
+              <a:gd name="connsiteY2" fmla="*/ 1196340 h 1196340"/>
+            </a:gdLst>
+            <a:ahLst/>
+            <a:cxnLst>
+              <a:cxn ang="0">
+                <a:pos x="connsiteX0" y="connsiteY0"/>
+              </a:cxn>
+              <a:cxn ang="0">
+                <a:pos x="connsiteX1" y="connsiteY1"/>
+              </a:cxn>
+              <a:cxn ang="0">
+                <a:pos x="connsiteX2" y="connsiteY2"/>
+              </a:cxn>
+            </a:cxnLst>
+            <a:rect l="l" t="t" r="r" b="b"/>
+            <a:pathLst>
+              <a:path w="2520309" h="1196340">
+                <a:moveTo>
+                  <a:pt x="2520309" y="0"/>
+                </a:moveTo>
+                <a:cubicBezTo>
+                  <a:pt x="1666869" y="140335"/>
+                  <a:pt x="813429" y="280670"/>
+                  <a:pt x="394329" y="480060"/>
+                </a:cubicBezTo>
+                <a:cubicBezTo>
+                  <a:pt x="-24771" y="679450"/>
+                  <a:pt x="-9531" y="937895"/>
+                  <a:pt x="5709" y="1196340"/>
+                </a:cubicBezTo>
+              </a:path>
+            </a:pathLst>
+          </a:custGeom>
+          <a:noFill/>
+          <a:ln>
+            <a:solidFill>
+              <a:srgbClr val="FF0000"/>
+            </a:solidFill>
+            <a:headEnd type="oval" w="med" len="med"/>
+            <a:tailEnd type="oval" w="med" len="med"/>
+          </a:ln>
+        </p:spPr>
+        <p:style>
+          <a:lnRef idx="2">
+            <a:schemeClr val="accent1">
+              <a:shade val="50000"/>
+            </a:schemeClr>
+          </a:lnRef>
+          <a:fillRef idx="1">
+            <a:schemeClr val="accent1"/>
+          </a:fillRef>
+          <a:effectRef idx="0">
+            <a:schemeClr val="accent1"/>
+          </a:effectRef>
+          <a:fontRef idx="minor">
+            <a:schemeClr val="lt1"/>
+          </a:fontRef>
+        </p:style>
+        <p:txBody>
+          <a:bodyPr rtlCol="0" anchor="ctr"/>
+          <a:lstStyle/>
+          <a:p>
+            <a:pPr algn="ctr"/>
+            <a:endParaRPr lang="en-CA"/>
           </a:p>
         </p:txBody>
       </p:sp>

</xml_diff>